<commit_message>
New Lecture notes added
</commit_message>
<xml_diff>
--- a/Lecture Notes-Slides/Lecture 17.pptx
+++ b/Lecture Notes-Slides/Lecture 17.pptx
@@ -206,7 +206,7 @@
           <a:p>
             <a:fld id="{3CD8CDE9-AB48-C440-BEA7-178B6AFE13C6}" type="datetimeFigureOut">
               <a:rPr lang="en-US" smtClean="0"/>
-              <a:t>3/28/16</a:t>
+              <a:t>8/9/16</a:t>
             </a:fld>
             <a:endParaRPr lang="en-US"/>
           </a:p>
@@ -762,7 +762,7 @@
           <a:p>
             <a:fld id="{D2A20FDA-B114-644D-8BBD-3AC22460846A}" type="datetimeFigureOut">
               <a:rPr lang="en-US" smtClean="0"/>
-              <a:t>3/28/16</a:t>
+              <a:t>8/9/16</a:t>
             </a:fld>
             <a:endParaRPr lang="en-US"/>
           </a:p>
@@ -927,7 +927,7 @@
           <a:p>
             <a:fld id="{D2A20FDA-B114-644D-8BBD-3AC22460846A}" type="datetimeFigureOut">
               <a:rPr lang="en-US" smtClean="0"/>
-              <a:t>3/28/16</a:t>
+              <a:t>8/9/16</a:t>
             </a:fld>
             <a:endParaRPr lang="en-US"/>
           </a:p>
@@ -1102,7 +1102,7 @@
           <a:p>
             <a:fld id="{D2A20FDA-B114-644D-8BBD-3AC22460846A}" type="datetimeFigureOut">
               <a:rPr lang="en-US" smtClean="0"/>
-              <a:t>3/28/16</a:t>
+              <a:t>8/9/16</a:t>
             </a:fld>
             <a:endParaRPr lang="en-US"/>
           </a:p>
@@ -1267,7 +1267,7 @@
           <a:p>
             <a:fld id="{D2A20FDA-B114-644D-8BBD-3AC22460846A}" type="datetimeFigureOut">
               <a:rPr lang="en-US" smtClean="0"/>
-              <a:t>3/28/16</a:t>
+              <a:t>8/9/16</a:t>
             </a:fld>
             <a:endParaRPr lang="en-US"/>
           </a:p>
@@ -1508,7 +1508,7 @@
           <a:p>
             <a:fld id="{D2A20FDA-B114-644D-8BBD-3AC22460846A}" type="datetimeFigureOut">
               <a:rPr lang="en-US" smtClean="0"/>
-              <a:t>3/28/16</a:t>
+              <a:t>8/9/16</a:t>
             </a:fld>
             <a:endParaRPr lang="en-US"/>
           </a:p>
@@ -1791,7 +1791,7 @@
           <a:p>
             <a:fld id="{D2A20FDA-B114-644D-8BBD-3AC22460846A}" type="datetimeFigureOut">
               <a:rPr lang="en-US" smtClean="0"/>
-              <a:t>3/28/16</a:t>
+              <a:t>8/9/16</a:t>
             </a:fld>
             <a:endParaRPr lang="en-US"/>
           </a:p>
@@ -2220,7 +2220,7 @@
           <a:p>
             <a:fld id="{D2A20FDA-B114-644D-8BBD-3AC22460846A}" type="datetimeFigureOut">
               <a:rPr lang="en-US" smtClean="0"/>
-              <a:t>3/28/16</a:t>
+              <a:t>8/9/16</a:t>
             </a:fld>
             <a:endParaRPr lang="en-US"/>
           </a:p>
@@ -2333,7 +2333,7 @@
           <a:p>
             <a:fld id="{D2A20FDA-B114-644D-8BBD-3AC22460846A}" type="datetimeFigureOut">
               <a:rPr lang="en-US" smtClean="0"/>
-              <a:t>3/28/16</a:t>
+              <a:t>8/9/16</a:t>
             </a:fld>
             <a:endParaRPr lang="en-US"/>
           </a:p>
@@ -2423,7 +2423,7 @@
           <a:p>
             <a:fld id="{D2A20FDA-B114-644D-8BBD-3AC22460846A}" type="datetimeFigureOut">
               <a:rPr lang="en-US" smtClean="0"/>
-              <a:t>3/28/16</a:t>
+              <a:t>8/9/16</a:t>
             </a:fld>
             <a:endParaRPr lang="en-US"/>
           </a:p>
@@ -2612,7 +2612,7 @@
           <a:p>
             <a:fld id="{D2A20FDA-B114-644D-8BBD-3AC22460846A}" type="datetimeFigureOut">
               <a:rPr lang="en-US" smtClean="0"/>
-              <a:t>3/28/16</a:t>
+              <a:t>8/9/16</a:t>
             </a:fld>
             <a:endParaRPr lang="en-US"/>
           </a:p>
@@ -2930,7 +2930,7 @@
           <a:p>
             <a:fld id="{D2A20FDA-B114-644D-8BBD-3AC22460846A}" type="datetimeFigureOut">
               <a:rPr lang="en-US" smtClean="0"/>
-              <a:t>3/28/16</a:t>
+              <a:t>8/9/16</a:t>
             </a:fld>
             <a:endParaRPr lang="en-US"/>
           </a:p>
@@ -3309,7 +3309,7 @@
           <a:p>
             <a:fld id="{D2A20FDA-B114-644D-8BBD-3AC22460846A}" type="datetimeFigureOut">
               <a:rPr lang="en-US" smtClean="0"/>
-              <a:t>3/28/16</a:t>
+              <a:t>8/9/16</a:t>
             </a:fld>
             <a:endParaRPr lang="en-US"/>
           </a:p>
@@ -3820,7 +3820,7 @@
             </a:r>
             <a:r>
               <a:rPr lang="en-US" dirty="0" smtClean="0"/>
-              <a:t>a </a:t>
+              <a:t>is a </a:t>
             </a:r>
             <a:r>
               <a:rPr lang="en-US" dirty="0"/>
@@ -4099,7 +4099,11 @@
             <a:pPr lvl="1"/>
             <a:r>
               <a:rPr lang="en-US" dirty="0" smtClean="0"/>
-              <a:t>If feature space is quantitative then you shall use </a:t>
+              <a:t>If feature space is </a:t>
+            </a:r>
+            <a:r>
+              <a:rPr lang="en-US" dirty="0" smtClean="0"/>
+              <a:t>quantitative, you better use </a:t>
             </a:r>
             <a:r>
               <a:rPr lang="en-US" dirty="0" err="1" smtClean="0"/>
@@ -4111,7 +4115,15 @@
             <a:pPr lvl="1"/>
             <a:r>
               <a:rPr lang="en-US" dirty="0" smtClean="0"/>
-              <a:t>If feature space is Binary, then you better use </a:t>
+              <a:t>If feature space is Binary, </a:t>
+            </a:r>
+            <a:r>
+              <a:rPr lang="en-US" dirty="0"/>
+              <a:t>you </a:t>
+            </a:r>
+            <a:r>
+              <a:rPr lang="en-US" dirty="0" smtClean="0"/>
+              <a:t>better use </a:t>
             </a:r>
             <a:r>
               <a:rPr lang="en-US" dirty="0" err="1" smtClean="0"/>
@@ -4123,7 +4135,11 @@
             <a:pPr lvl="1"/>
             <a:r>
               <a:rPr lang="en-US" dirty="0" smtClean="0"/>
-              <a:t>If feature space is discrete counts, then you can use </a:t>
+              <a:t>If feature space is discrete </a:t>
+            </a:r>
+            <a:r>
+              <a:rPr lang="en-US" dirty="0" smtClean="0"/>
+              <a:t>counts, you better use </a:t>
             </a:r>
             <a:r>
               <a:rPr lang="en-US" dirty="0" err="1" smtClean="0"/>
@@ -4138,7 +4154,15 @@
             <a:pPr lvl="1"/>
             <a:r>
               <a:rPr lang="en-US" dirty="0" smtClean="0"/>
-              <a:t>Can you come up with few examples for each class of NB?</a:t>
+              <a:t>Can you come up with few examples for each </a:t>
+            </a:r>
+            <a:r>
+              <a:rPr lang="en-US" dirty="0" smtClean="0"/>
+              <a:t>type of </a:t>
+            </a:r>
+            <a:r>
+              <a:rPr lang="en-US" dirty="0" smtClean="0"/>
+              <a:t>NB?</a:t>
             </a:r>
             <a:endParaRPr lang="en-US" dirty="0"/>
           </a:p>
@@ -4489,7 +4513,15 @@
           <a:p>
             <a:r>
               <a:rPr lang="en-US" dirty="0" smtClean="0"/>
-              <a:t>Your assumption for Gaussian NB is, your feature variables are independent and Normally distributed. </a:t>
+              <a:t>Your assumption for Gaussian NB </a:t>
+            </a:r>
+            <a:r>
+              <a:rPr lang="en-US" dirty="0" smtClean="0"/>
+              <a:t>is that </a:t>
+            </a:r>
+            <a:r>
+              <a:rPr lang="en-US" dirty="0" smtClean="0"/>
+              <a:t>your feature variables are independent and Normally distributed. </a:t>
             </a:r>
             <a:endParaRPr lang="en-US" dirty="0"/>
           </a:p>
@@ -4525,6 +4557,18 @@
         <p:blipFill>
           <a:blip r:embed="rId2">
             <a:extLst>
+              <a:ext uri="{BEBA8EAE-BF5A-486C-A8C5-ECC9F3942E4B}">
+                <a14:imgProps xmlns:a14="http://schemas.microsoft.com/office/drawing/2010/main">
+                  <a14:imgLayer r:embed="rId3">
+                    <a14:imgEffect>
+                      <a14:sharpenSoften amount="54000"/>
+                    </a14:imgEffect>
+                    <a14:imgEffect>
+                      <a14:saturation sat="126000"/>
+                    </a14:imgEffect>
+                  </a14:imgLayer>
+                </a14:imgProps>
+              </a:ext>
               <a:ext uri="{28A0092B-C50C-407E-A947-70E740481C1C}">
                 <a14:useLocalDpi xmlns:a14="http://schemas.microsoft.com/office/drawing/2010/main" val="0"/>
               </a:ext>
@@ -4536,7 +4580,7 @@
         </p:blipFill>
         <p:spPr>
           <a:xfrm>
-            <a:off x="1622424" y="5779943"/>
+            <a:off x="1622424" y="5795818"/>
             <a:ext cx="4505325" cy="744682"/>
           </a:xfrm>
           <a:prstGeom prst="rect">
@@ -4891,8 +4935,13 @@
           <a:p>
             <a:r>
               <a:rPr lang="en-US" dirty="0" smtClean="0"/>
-              <a:t>Great for multi-class cases </a:t>
-            </a:r>
+              <a:t>Great for multi-class </a:t>
+            </a:r>
+            <a:r>
+              <a:rPr lang="en-US" dirty="0" smtClean="0"/>
+              <a:t>problems</a:t>
+            </a:r>
+            <a:endParaRPr lang="en-US" dirty="0" smtClean="0"/>
           </a:p>
           <a:p>
             <a:r>
@@ -4903,7 +4952,15 @@
           <a:p>
             <a:r>
               <a:rPr lang="en-US" dirty="0" smtClean="0"/>
-              <a:t>There is no parameter needed to be tuned. (an exception might be alpha – which by definition is not a tuning parameter).</a:t>
+              <a:t>There is no </a:t>
+            </a:r>
+            <a:r>
+              <a:rPr lang="en-US" dirty="0" smtClean="0"/>
+              <a:t>parameter that </a:t>
+            </a:r>
+            <a:r>
+              <a:rPr lang="en-US" dirty="0" smtClean="0"/>
+              <a:t>needed to be tuned. (an exception might be alpha – which by definition is not a tuning parameter).</a:t>
             </a:r>
           </a:p>
           <a:p>
@@ -5323,8 +5380,13 @@
           <a:p>
             <a:r>
               <a:rPr lang="en-US" dirty="0" smtClean="0"/>
-              <a:t>It works under the strong assumption that your feature inputs are independent. </a:t>
-            </a:r>
+              <a:t>It works under the strong assumption that </a:t>
+            </a:r>
+            <a:r>
+              <a:rPr lang="en-US" dirty="0" smtClean="0"/>
+              <a:t>of independency of your feature inputs. </a:t>
+            </a:r>
+            <a:endParaRPr lang="en-US" dirty="0" smtClean="0"/>
           </a:p>
           <a:p>
             <a:r>
@@ -5983,11 +6045,7 @@
             </a:r>
             <a:r>
               <a:rPr lang="en-US" smtClean="0"/>
-              <a:t>using </a:t>
-            </a:r>
-            <a:r>
-              <a:rPr lang="en-US" smtClean="0"/>
-              <a:t>NB</a:t>
+              <a:t>using NB</a:t>
             </a:r>
             <a:endParaRPr lang="en-US" dirty="0" smtClean="0"/>
           </a:p>
@@ -6313,7 +6371,15 @@
           <a:p>
             <a:r>
               <a:rPr lang="en-US" dirty="0" smtClean="0"/>
-              <a:t>There are extremely easy to build and very useful for very large data sets.</a:t>
+              <a:t>There are extremely easy to build and very useful for </a:t>
+            </a:r>
+            <a:r>
+              <a:rPr lang="en-US" dirty="0" smtClean="0"/>
+              <a:t>large </a:t>
+            </a:r>
+            <a:r>
+              <a:rPr lang="en-US" dirty="0" smtClean="0"/>
+              <a:t>data sets.</a:t>
             </a:r>
           </a:p>
           <a:p>
@@ -6613,6 +6679,24 @@
         <p:blipFill rotWithShape="1">
           <a:blip r:embed="rId2">
             <a:extLst>
+              <a:ext uri="{BEBA8EAE-BF5A-486C-A8C5-ECC9F3942E4B}">
+                <a14:imgProps xmlns:a14="http://schemas.microsoft.com/office/drawing/2010/main">
+                  <a14:imgLayer r:embed="rId3">
+                    <a14:imgEffect>
+                      <a14:sharpenSoften amount="4000"/>
+                    </a14:imgEffect>
+                    <a14:imgEffect>
+                      <a14:colorTemperature colorTemp="6609"/>
+                    </a14:imgEffect>
+                    <a14:imgEffect>
+                      <a14:saturation sat="400000"/>
+                    </a14:imgEffect>
+                    <a14:imgEffect>
+                      <a14:brightnessContrast bright="-15000" contrast="-9000"/>
+                    </a14:imgEffect>
+                  </a14:imgLayer>
+                </a14:imgProps>
+              </a:ext>
               <a:ext uri="{28A0092B-C50C-407E-A947-70E740481C1C}">
                 <a14:useLocalDpi xmlns:a14="http://schemas.microsoft.com/office/drawing/2010/main" val="0"/>
               </a:ext>
@@ -6623,7 +6707,7 @@
         </p:blipFill>
         <p:spPr>
           <a:xfrm>
-            <a:off x="917575" y="1841954"/>
+            <a:off x="917575" y="1810204"/>
             <a:ext cx="6797675" cy="3450631"/>
           </a:xfrm>
         </p:spPr>
@@ -7132,12 +7216,12 @@
           <a:graphicData uri="http://schemas.openxmlformats.org/presentationml/2006/ole">
             <mc:AlternateContent xmlns:mc="http://schemas.openxmlformats.org/markup-compatibility/2006">
               <mc:Choice xmlns:v="urn:schemas-microsoft-com:vml" Requires="v">
-                <p:oleObj spid="_x0000_s3085" name="Document" r:id="rId5" imgW="7128360" imgH="5781600" progId="Word.Document.8">
+                <p:oleObj spid="_x0000_s3094" name="Document" r:id="rId4" imgW="7128360" imgH="5781600" progId="Word.Document.8">
                   <p:embed/>
                 </p:oleObj>
               </mc:Choice>
               <mc:Fallback>
-                <p:oleObj name="Document" r:id="rId5" imgW="7128360" imgH="5781600" progId="Word.Document.8">
+                <p:oleObj name="Document" r:id="rId4" imgW="7128360" imgH="5781600" progId="Word.Document.8">
                   <p:embed/>
                   <p:pic>
                     <p:nvPicPr>
@@ -7148,7 +7232,7 @@
                       <p:nvPr/>
                     </p:nvPicPr>
                     <p:blipFill>
-                      <a:blip r:embed="rId6">
+                      <a:blip r:embed="rId5">
                         <a:extLst>
                           <a:ext uri="{28A0092B-C50C-407E-A947-70E740481C1C}">
                             <a14:useLocalDpi xmlns:a14="http://schemas.microsoft.com/office/drawing/2010/main" val="0"/>
@@ -7366,7 +7450,7 @@
           <a:graphicData uri="http://schemas.openxmlformats.org/presentationml/2006/ole">
             <mc:AlternateContent xmlns:mc="http://schemas.openxmlformats.org/markup-compatibility/2006">
               <mc:Choice xmlns:v="urn:schemas-microsoft-com:vml" Requires="v">
-                <p:oleObj spid="_x0000_s6157" name="Equation" r:id="rId3" imgW="4267200" imgH="1803400" progId="Equation.3">
+                <p:oleObj spid="_x0000_s6166" name="Equation" r:id="rId3" imgW="4267200" imgH="1803400" progId="Equation.3">
                   <p:embed/>
                 </p:oleObj>
               </mc:Choice>

</xml_diff>